<commit_message>
Fixed heading to correct semester
</commit_message>
<xml_diff>
--- a/2021fa_cs361s/slides/07_Asymmetric_Cryptography.pptx
+++ b/2021fa_cs361s/slides/07_Asymmetric_Cryptography.pptx
@@ -6464,8 +6464,12 @@
           </a:p>
           <a:p>
             <a:r>
+              <a:rPr lang="en-US" b="1"/>
+              <a:t>Fall </a:t>
+            </a:r>
+            <a:r>
               <a:rPr lang="en-US" b="1" dirty="0"/>
-              <a:t>Spring 2021</a:t>
+              <a:t>2021</a:t>
             </a:r>
           </a:p>
           <a:p>

</xml_diff>